<commit_message>
refactored surveys.js flow is working again
</commit_message>
<xml_diff>
--- a/sql/SurveyTables.pptx
+++ b/sql/SurveyTables.pptx
@@ -270,7 +270,7 @@
           <a:p>
             <a:fld id="{3731B3E4-154A-8745-9F3C-ACEACDDEC42E}" type="datetimeFigureOut">
               <a:rPr lang="en-US" smtClean="0"/>
-              <a:t>4/15/25</a:t>
+              <a:t>4/18/25</a:t>
             </a:fld>
             <a:endParaRPr lang="en-US"/>
           </a:p>
@@ -468,7 +468,7 @@
           <a:p>
             <a:fld id="{3731B3E4-154A-8745-9F3C-ACEACDDEC42E}" type="datetimeFigureOut">
               <a:rPr lang="en-US" smtClean="0"/>
-              <a:t>4/15/25</a:t>
+              <a:t>4/18/25</a:t>
             </a:fld>
             <a:endParaRPr lang="en-US"/>
           </a:p>
@@ -676,7 +676,7 @@
           <a:p>
             <a:fld id="{3731B3E4-154A-8745-9F3C-ACEACDDEC42E}" type="datetimeFigureOut">
               <a:rPr lang="en-US" smtClean="0"/>
-              <a:t>4/15/25</a:t>
+              <a:t>4/18/25</a:t>
             </a:fld>
             <a:endParaRPr lang="en-US"/>
           </a:p>
@@ -874,7 +874,7 @@
           <a:p>
             <a:fld id="{3731B3E4-154A-8745-9F3C-ACEACDDEC42E}" type="datetimeFigureOut">
               <a:rPr lang="en-US" smtClean="0"/>
-              <a:t>4/15/25</a:t>
+              <a:t>4/18/25</a:t>
             </a:fld>
             <a:endParaRPr lang="en-US"/>
           </a:p>
@@ -1149,7 +1149,7 @@
           <a:p>
             <a:fld id="{3731B3E4-154A-8745-9F3C-ACEACDDEC42E}" type="datetimeFigureOut">
               <a:rPr lang="en-US" smtClean="0"/>
-              <a:t>4/15/25</a:t>
+              <a:t>4/18/25</a:t>
             </a:fld>
             <a:endParaRPr lang="en-US"/>
           </a:p>
@@ -1414,7 +1414,7 @@
           <a:p>
             <a:fld id="{3731B3E4-154A-8745-9F3C-ACEACDDEC42E}" type="datetimeFigureOut">
               <a:rPr lang="en-US" smtClean="0"/>
-              <a:t>4/15/25</a:t>
+              <a:t>4/18/25</a:t>
             </a:fld>
             <a:endParaRPr lang="en-US"/>
           </a:p>
@@ -1826,7 +1826,7 @@
           <a:p>
             <a:fld id="{3731B3E4-154A-8745-9F3C-ACEACDDEC42E}" type="datetimeFigureOut">
               <a:rPr lang="en-US" smtClean="0"/>
-              <a:t>4/15/25</a:t>
+              <a:t>4/18/25</a:t>
             </a:fld>
             <a:endParaRPr lang="en-US"/>
           </a:p>
@@ -1967,7 +1967,7 @@
           <a:p>
             <a:fld id="{3731B3E4-154A-8745-9F3C-ACEACDDEC42E}" type="datetimeFigureOut">
               <a:rPr lang="en-US" smtClean="0"/>
-              <a:t>4/15/25</a:t>
+              <a:t>4/18/25</a:t>
             </a:fld>
             <a:endParaRPr lang="en-US"/>
           </a:p>
@@ -2080,7 +2080,7 @@
           <a:p>
             <a:fld id="{3731B3E4-154A-8745-9F3C-ACEACDDEC42E}" type="datetimeFigureOut">
               <a:rPr lang="en-US" smtClean="0"/>
-              <a:t>4/15/25</a:t>
+              <a:t>4/18/25</a:t>
             </a:fld>
             <a:endParaRPr lang="en-US"/>
           </a:p>
@@ -2391,7 +2391,7 @@
           <a:p>
             <a:fld id="{3731B3E4-154A-8745-9F3C-ACEACDDEC42E}" type="datetimeFigureOut">
               <a:rPr lang="en-US" smtClean="0"/>
-              <a:t>4/15/25</a:t>
+              <a:t>4/18/25</a:t>
             </a:fld>
             <a:endParaRPr lang="en-US"/>
           </a:p>
@@ -2679,7 +2679,7 @@
           <a:p>
             <a:fld id="{3731B3E4-154A-8745-9F3C-ACEACDDEC42E}" type="datetimeFigureOut">
               <a:rPr lang="en-US" smtClean="0"/>
-              <a:t>4/15/25</a:t>
+              <a:t>4/18/25</a:t>
             </a:fld>
             <a:endParaRPr lang="en-US"/>
           </a:p>
@@ -2920,7 +2920,7 @@
           <a:p>
             <a:fld id="{3731B3E4-154A-8745-9F3C-ACEACDDEC42E}" type="datetimeFigureOut">
               <a:rPr lang="en-US" smtClean="0"/>
-              <a:t>4/15/25</a:t>
+              <a:t>4/18/25</a:t>
             </a:fld>
             <a:endParaRPr lang="en-US"/>
           </a:p>
@@ -4402,7 +4402,7 @@
         <p:spPr>
           <a:xfrm>
             <a:off x="7386658" y="293159"/>
-            <a:ext cx="1873405" cy="997759"/>
+            <a:ext cx="1873405" cy="1218770"/>
           </a:xfrm>
           <a:prstGeom prst="rect">
             <a:avLst/>
@@ -4447,15 +4447,16 @@
           <a:p>
             <a:pPr algn="ctr"/>
             <a:r>
-              <a:rPr lang="en-US" sz="1400" b="1" dirty="0"/>
-              <a:t>revision</a:t>
-            </a:r>
+              <a:rPr lang="en-US" sz="1400" b="1" dirty="0" err="1"/>
+              <a:t>survey_id</a:t>
+            </a:r>
+            <a:endParaRPr lang="en-US" sz="1400" b="1" dirty="0"/>
           </a:p>
           <a:p>
             <a:pPr algn="ctr"/>
             <a:r>
               <a:rPr lang="en-US" sz="1400" dirty="0"/>
-              <a:t>string</a:t>
+              <a:t>…</a:t>
             </a:r>
           </a:p>
         </p:txBody>
@@ -4475,7 +4476,7 @@
         <p:spPr>
           <a:xfrm>
             <a:off x="2599794" y="2180546"/>
-            <a:ext cx="2090858" cy="1268015"/>
+            <a:ext cx="2090858" cy="1403141"/>
           </a:xfrm>
           <a:prstGeom prst="rect">
             <a:avLst/>
@@ -4557,6 +4558,22 @@
           <a:p>
             <a:pPr algn="ctr"/>
             <a:r>
+              <a:rPr lang="en-US" sz="1400" b="1" dirty="0" err="1">
+                <a:solidFill>
+                  <a:schemeClr val="tx1"/>
+                </a:solidFill>
+              </a:rPr>
+              <a:t>option_seq</a:t>
+            </a:r>
+            <a:endParaRPr lang="en-US" sz="1400" b="1" dirty="0">
+              <a:solidFill>
+                <a:schemeClr val="tx1"/>
+              </a:solidFill>
+            </a:endParaRPr>
+          </a:p>
+          <a:p>
+            <a:pPr algn="ctr"/>
+            <a:r>
               <a:rPr lang="en-US" sz="1400" dirty="0" err="1">
                 <a:solidFill>
                   <a:schemeClr val="tx1"/>
@@ -4576,18 +4593,13 @@
           <a:p>
             <a:pPr algn="ctr"/>
             <a:r>
-              <a:rPr lang="en-US" sz="1400" dirty="0" err="1">
+              <a:rPr lang="en-US" sz="1400" dirty="0">
                 <a:solidFill>
                   <a:schemeClr val="tx1"/>
                 </a:solidFill>
               </a:rPr>
-              <a:t>option_revision</a:t>
-            </a:r>
-            <a:endParaRPr lang="en-US" sz="1400" dirty="0">
-              <a:solidFill>
-                <a:schemeClr val="tx1"/>
-              </a:solidFill>
-            </a:endParaRPr>
+              <a:t>…</a:t>
+            </a:r>
           </a:p>
         </p:txBody>
       </p:sp>

</xml_diff>